<commit_message>
Concluded the second draft of the results section
</commit_message>
<xml_diff>
--- a/Manuscript/Figures/04_Results_ROCs.pptx
+++ b/Manuscript/Figures/04_Results_ROCs.pptx
@@ -115,7 +115,7 @@
 <file path=ppt/revisionInfo.xml><?xml version="1.0" encoding="utf-8"?>
 <p1510:revInfo xmlns:a="http://schemas.openxmlformats.org/drawingml/2006/main" xmlns:r="http://schemas.openxmlformats.org/officeDocument/2006/relationships" xmlns:p1510="http://schemas.microsoft.com/office/powerpoint/2015/10/main">
   <p1510:revLst>
-    <p1510:client id="{7F8EC0BD-3197-4221-A0D0-BDDD66987831}" v="2" dt="2023-12-13T22:48:30.957"/>
+    <p1510:client id="{7F8EC0BD-3197-4221-A0D0-BDDD66987831}" v="4" dt="2023-12-17T09:09:56.491"/>
   </p1510:revLst>
 </p1510:revInfo>
 </file>
@@ -125,16 +125,32 @@
   <pc:docChgLst>
     <pc:chgData name="Fatima Pillosu" userId="a6295d4dc9e22643" providerId="LiveId" clId="{7F8EC0BD-3197-4221-A0D0-BDDD66987831}"/>
     <pc:docChg chg="custSel modSld">
-      <pc:chgData name="Fatima Pillosu" userId="a6295d4dc9e22643" providerId="LiveId" clId="{7F8EC0BD-3197-4221-A0D0-BDDD66987831}" dt="2023-12-13T22:48:30.957" v="20"/>
+      <pc:chgData name="Fatima Pillosu" userId="a6295d4dc9e22643" providerId="LiveId" clId="{7F8EC0BD-3197-4221-A0D0-BDDD66987831}" dt="2023-12-17T09:10:25.407" v="37" actId="1036"/>
       <pc:docMkLst>
         <pc:docMk/>
       </pc:docMkLst>
       <pc:sldChg chg="addSp delSp modSp mod">
-        <pc:chgData name="Fatima Pillosu" userId="a6295d4dc9e22643" providerId="LiveId" clId="{7F8EC0BD-3197-4221-A0D0-BDDD66987831}" dt="2023-12-13T22:48:30.957" v="20"/>
+        <pc:chgData name="Fatima Pillosu" userId="a6295d4dc9e22643" providerId="LiveId" clId="{7F8EC0BD-3197-4221-A0D0-BDDD66987831}" dt="2023-12-17T09:10:25.407" v="37" actId="1036"/>
         <pc:sldMkLst>
           <pc:docMk/>
           <pc:sldMk cId="3435567076" sldId="256"/>
         </pc:sldMkLst>
+        <pc:spChg chg="add mod">
+          <ac:chgData name="Fatima Pillosu" userId="a6295d4dc9e22643" providerId="LiveId" clId="{7F8EC0BD-3197-4221-A0D0-BDDD66987831}" dt="2023-12-17T09:10:25.407" v="37" actId="1036"/>
+          <ac:spMkLst>
+            <pc:docMk/>
+            <pc:sldMk cId="3435567076" sldId="256"/>
+            <ac:spMk id="3" creationId="{E514386B-A81B-4A89-7DA6-8A2B6F9D3897}"/>
+          </ac:spMkLst>
+        </pc:spChg>
+        <pc:spChg chg="add mod">
+          <ac:chgData name="Fatima Pillosu" userId="a6295d4dc9e22643" providerId="LiveId" clId="{7F8EC0BD-3197-4221-A0D0-BDDD66987831}" dt="2023-12-17T09:10:17.509" v="36" actId="1036"/>
+          <ac:spMkLst>
+            <pc:docMk/>
+            <pc:sldMk cId="3435567076" sldId="256"/>
+            <ac:spMk id="4" creationId="{C2178EB9-633D-86C0-F9CD-2CE33749A8C8}"/>
+          </ac:spMkLst>
+        </pc:spChg>
         <pc:spChg chg="del">
           <ac:chgData name="Fatima Pillosu" userId="a6295d4dc9e22643" providerId="LiveId" clId="{7F8EC0BD-3197-4221-A0D0-BDDD66987831}" dt="2023-12-13T22:47:47.225" v="3" actId="478"/>
           <ac:spMkLst>
@@ -344,7 +360,7 @@
           <a:p>
             <a:fld id="{0848591D-C236-4355-B393-0D10ED842594}" type="datetimeFigureOut">
               <a:rPr lang="en-GB" smtClean="0"/>
-              <a:t>13/12/2023</a:t>
+              <a:t>17/12/2023</a:t>
             </a:fld>
             <a:endParaRPr lang="en-GB"/>
           </a:p>
@@ -514,7 +530,7 @@
           <a:p>
             <a:fld id="{0848591D-C236-4355-B393-0D10ED842594}" type="datetimeFigureOut">
               <a:rPr lang="en-GB" smtClean="0"/>
-              <a:t>13/12/2023</a:t>
+              <a:t>17/12/2023</a:t>
             </a:fld>
             <a:endParaRPr lang="en-GB"/>
           </a:p>
@@ -694,7 +710,7 @@
           <a:p>
             <a:fld id="{0848591D-C236-4355-B393-0D10ED842594}" type="datetimeFigureOut">
               <a:rPr lang="en-GB" smtClean="0"/>
-              <a:t>13/12/2023</a:t>
+              <a:t>17/12/2023</a:t>
             </a:fld>
             <a:endParaRPr lang="en-GB"/>
           </a:p>
@@ -864,7 +880,7 @@
           <a:p>
             <a:fld id="{0848591D-C236-4355-B393-0D10ED842594}" type="datetimeFigureOut">
               <a:rPr lang="en-GB" smtClean="0"/>
-              <a:t>13/12/2023</a:t>
+              <a:t>17/12/2023</a:t>
             </a:fld>
             <a:endParaRPr lang="en-GB"/>
           </a:p>
@@ -1108,7 +1124,7 @@
           <a:p>
             <a:fld id="{0848591D-C236-4355-B393-0D10ED842594}" type="datetimeFigureOut">
               <a:rPr lang="en-GB" smtClean="0"/>
-              <a:t>13/12/2023</a:t>
+              <a:t>17/12/2023</a:t>
             </a:fld>
             <a:endParaRPr lang="en-GB"/>
           </a:p>
@@ -1340,7 +1356,7 @@
           <a:p>
             <a:fld id="{0848591D-C236-4355-B393-0D10ED842594}" type="datetimeFigureOut">
               <a:rPr lang="en-GB" smtClean="0"/>
-              <a:t>13/12/2023</a:t>
+              <a:t>17/12/2023</a:t>
             </a:fld>
             <a:endParaRPr lang="en-GB"/>
           </a:p>
@@ -1707,7 +1723,7 @@
           <a:p>
             <a:fld id="{0848591D-C236-4355-B393-0D10ED842594}" type="datetimeFigureOut">
               <a:rPr lang="en-GB" smtClean="0"/>
-              <a:t>13/12/2023</a:t>
+              <a:t>17/12/2023</a:t>
             </a:fld>
             <a:endParaRPr lang="en-GB"/>
           </a:p>
@@ -1825,7 +1841,7 @@
           <a:p>
             <a:fld id="{0848591D-C236-4355-B393-0D10ED842594}" type="datetimeFigureOut">
               <a:rPr lang="en-GB" smtClean="0"/>
-              <a:t>13/12/2023</a:t>
+              <a:t>17/12/2023</a:t>
             </a:fld>
             <a:endParaRPr lang="en-GB"/>
           </a:p>
@@ -1920,7 +1936,7 @@
           <a:p>
             <a:fld id="{0848591D-C236-4355-B393-0D10ED842594}" type="datetimeFigureOut">
               <a:rPr lang="en-GB" smtClean="0"/>
-              <a:t>13/12/2023</a:t>
+              <a:t>17/12/2023</a:t>
             </a:fld>
             <a:endParaRPr lang="en-GB"/>
           </a:p>
@@ -2197,7 +2213,7 @@
           <a:p>
             <a:fld id="{0848591D-C236-4355-B393-0D10ED842594}" type="datetimeFigureOut">
               <a:rPr lang="en-GB" smtClean="0"/>
-              <a:t>13/12/2023</a:t>
+              <a:t>17/12/2023</a:t>
             </a:fld>
             <a:endParaRPr lang="en-GB"/>
           </a:p>
@@ -2454,7 +2470,7 @@
           <a:p>
             <a:fld id="{0848591D-C236-4355-B393-0D10ED842594}" type="datetimeFigureOut">
               <a:rPr lang="en-GB" smtClean="0"/>
-              <a:t>13/12/2023</a:t>
+              <a:t>17/12/2023</a:t>
             </a:fld>
             <a:endParaRPr lang="en-GB"/>
           </a:p>
@@ -2667,7 +2683,7 @@
           <a:p>
             <a:fld id="{0848591D-C236-4355-B393-0D10ED842594}" type="datetimeFigureOut">
               <a:rPr lang="en-GB" smtClean="0"/>
-              <a:t>13/12/2023</a:t>
+              <a:t>17/12/2023</a:t>
             </a:fld>
             <a:endParaRPr lang="en-GB"/>
           </a:p>
@@ -3107,6 +3123,94 @@
           </a:prstGeom>
         </p:spPr>
       </p:pic>
+      <p:sp>
+        <p:nvSpPr>
+          <p:cNvPr id="3" name="CasellaDiTesto 2">
+            <a:extLst>
+              <a:ext uri="{FF2B5EF4-FFF2-40B4-BE49-F238E27FC236}">
+                <a16:creationId xmlns:a16="http://schemas.microsoft.com/office/drawing/2014/main" id="{E514386B-A81B-4A89-7DA6-8A2B6F9D3897}"/>
+              </a:ext>
+            </a:extLst>
+          </p:cNvPr>
+          <p:cNvSpPr txBox="1"/>
+          <p:nvPr/>
+        </p:nvSpPr>
+        <p:spPr>
+          <a:xfrm>
+            <a:off x="394304" y="933752"/>
+            <a:ext cx="149981" cy="369332"/>
+          </a:xfrm>
+          <a:prstGeom prst="rect">
+            <a:avLst/>
+          </a:prstGeom>
+          <a:noFill/>
+        </p:spPr>
+        <p:txBody>
+          <a:bodyPr wrap="square" rtlCol="0">
+            <a:spAutoFit/>
+          </a:bodyPr>
+          <a:lstStyle/>
+          <a:p>
+            <a:r>
+              <a:rPr lang="it-IT" dirty="0">
+                <a:solidFill>
+                  <a:srgbClr val="0000FF"/>
+                </a:solidFill>
+              </a:rPr>
+              <a:t>A</a:t>
+            </a:r>
+            <a:endParaRPr lang="en-GB" dirty="0">
+              <a:solidFill>
+                <a:srgbClr val="0000FF"/>
+              </a:solidFill>
+            </a:endParaRPr>
+          </a:p>
+        </p:txBody>
+      </p:sp>
+      <p:sp>
+        <p:nvSpPr>
+          <p:cNvPr id="4" name="CasellaDiTesto 3">
+            <a:extLst>
+              <a:ext uri="{FF2B5EF4-FFF2-40B4-BE49-F238E27FC236}">
+                <a16:creationId xmlns:a16="http://schemas.microsoft.com/office/drawing/2014/main" id="{C2178EB9-633D-86C0-F9CD-2CE33749A8C8}"/>
+              </a:ext>
+            </a:extLst>
+          </p:cNvPr>
+          <p:cNvSpPr txBox="1"/>
+          <p:nvPr/>
+        </p:nvSpPr>
+        <p:spPr>
+          <a:xfrm>
+            <a:off x="285447" y="1173238"/>
+            <a:ext cx="149981" cy="369332"/>
+          </a:xfrm>
+          <a:prstGeom prst="rect">
+            <a:avLst/>
+          </a:prstGeom>
+          <a:noFill/>
+        </p:spPr>
+        <p:txBody>
+          <a:bodyPr wrap="square" rtlCol="0">
+            <a:spAutoFit/>
+          </a:bodyPr>
+          <a:lstStyle/>
+          <a:p>
+            <a:r>
+              <a:rPr lang="it-IT" dirty="0">
+                <a:solidFill>
+                  <a:srgbClr val="0000FF"/>
+                </a:solidFill>
+              </a:rPr>
+              <a:t>B</a:t>
+            </a:r>
+            <a:endParaRPr lang="en-GB" dirty="0">
+              <a:solidFill>
+                <a:srgbClr val="0000FF"/>
+              </a:solidFill>
+            </a:endParaRPr>
+          </a:p>
+        </p:txBody>
+      </p:sp>
     </p:spTree>
     <p:extLst>
       <p:ext uri="{BB962C8B-B14F-4D97-AF65-F5344CB8AC3E}">

</xml_diff>